<commit_message>
Added some text to first two slides and figures wf
</commit_message>
<xml_diff>
--- a/Lab 2/SD2231-Lab2_Group7.pptx
+++ b/Lab 2/SD2231-Lab2_Group7.pptx
@@ -5,17 +5,18 @@
     <p:sldMasterId id="2147483648" r:id="rId1"/>
   </p:sldMasterIdLst>
   <p:notesMasterIdLst>
-    <p:notesMasterId r:id="rId7"/>
+    <p:notesMasterId r:id="rId8"/>
   </p:notesMasterIdLst>
   <p:handoutMasterIdLst>
-    <p:handoutMasterId r:id="rId8"/>
+    <p:handoutMasterId r:id="rId9"/>
   </p:handoutMasterIdLst>
   <p:sldIdLst>
     <p:sldId id="341" r:id="rId2"/>
     <p:sldId id="339" r:id="rId3"/>
     <p:sldId id="365" r:id="rId4"/>
     <p:sldId id="366" r:id="rId5"/>
-    <p:sldId id="292" r:id="rId6"/>
+    <p:sldId id="367" r:id="rId6"/>
+    <p:sldId id="292" r:id="rId7"/>
   </p:sldIdLst>
   <p:sldSz cx="9144000" cy="6858000" type="screen4x3"/>
   <p:notesSz cx="6858000" cy="9144000"/>
@@ -280,7 +281,7 @@
             <a:fld id="{7079D065-03A5-4C09-9A36-A973175AAF75}" type="datetimeFigureOut">
               <a:rPr lang="en-GB" smtClean="0"/>
               <a:pPr/>
-              <a:t>18/03/2018</a:t>
+              <a:t>03/05/2023</a:t>
             </a:fld>
             <a:endParaRPr lang="en-GB"/>
           </a:p>
@@ -448,7 +449,7 @@
             <a:fld id="{60802A76-B312-094B-9753-81FF1225BC67}" type="datetimeFigureOut">
               <a:rPr lang="en-US" smtClean="0"/>
               <a:pPr/>
-              <a:t>3/18/18</a:t>
+              <a:t>5/3/2023</a:t>
             </a:fld>
             <a:endParaRPr lang="en-US"/>
           </a:p>
@@ -925,7 +926,7 @@
           </a:ln>
           <a:extLst>
             <a:ext uri="{909E8E84-426E-40dd-AFC4-6F175D3DCCD1}">
-              <a14:hiddenFill xmlns="" xmlns:a14="http://schemas.microsoft.com/office/drawing/2010/main">
+              <a14:hiddenFill xmlns:a14="http://schemas.microsoft.com/office/drawing/2010/main" xmlns="">
                 <a:noFill/>
               </a14:hiddenFill>
             </a:ext>
@@ -2769,7 +2770,7 @@
           </a:ln>
           <a:extLst>
             <a:ext uri="{909E8E84-426E-40dd-AFC4-6F175D3DCCD1}">
-              <a14:hiddenFill xmlns="" xmlns:a14="http://schemas.microsoft.com/office/drawing/2010/main">
+              <a14:hiddenFill xmlns:a14="http://schemas.microsoft.com/office/drawing/2010/main" xmlns="">
                 <a:solidFill>
                   <a:srgbClr val="FFFFFF"/>
                 </a:solidFill>
@@ -5173,7 +5174,7 @@
           </a:ln>
           <a:extLst>
             <a:ext uri="{909E8E84-426E-40dd-AFC4-6F175D3DCCD1}">
-              <a14:hiddenFill xmlns="" xmlns:a14="http://schemas.microsoft.com/office/drawing/2010/main">
+              <a14:hiddenFill xmlns:a14="http://schemas.microsoft.com/office/drawing/2010/main" xmlns="">
                 <a:solidFill>
                   <a:srgbClr val="FFFFFF"/>
                 </a:solidFill>
@@ -7917,7 +7918,7 @@
           </a:ln>
           <a:extLst>
             <a:ext uri="{909E8E84-426E-40dd-AFC4-6F175D3DCCD1}">
-              <a14:hiddenFill xmlns="" xmlns:a14="http://schemas.microsoft.com/office/drawing/2010/main">
+              <a14:hiddenFill xmlns:a14="http://schemas.microsoft.com/office/drawing/2010/main" xmlns="">
                 <a:solidFill>
                   <a:srgbClr val="FFFFFF"/>
                 </a:solidFill>
@@ -9229,7 +9230,7 @@
           </a:ln>
           <a:extLst>
             <a:ext uri="{909E8E84-426E-40dd-AFC4-6F175D3DCCD1}">
-              <a14:hiddenFill xmlns="" xmlns:a14="http://schemas.microsoft.com/office/drawing/2010/main">
+              <a14:hiddenFill xmlns:a14="http://schemas.microsoft.com/office/drawing/2010/main" xmlns="">
                 <a:solidFill>
                   <a:srgbClr val="FFFFFF"/>
                 </a:solidFill>
@@ -10215,7 +10216,7 @@
           </a:ln>
           <a:extLst>
             <a:ext uri="{909E8E84-426E-40dd-AFC4-6F175D3DCCD1}">
-              <a14:hiddenFill xmlns="" xmlns:a14="http://schemas.microsoft.com/office/drawing/2010/main">
+              <a14:hiddenFill xmlns:a14="http://schemas.microsoft.com/office/drawing/2010/main" xmlns="">
                 <a:solidFill>
                   <a:srgbClr val="FFFFFF"/>
                 </a:solidFill>
@@ -10240,7 +10241,7 @@
           <p:cNvPr id="15" name="Rektangel 12">
             <a:extLst>
               <a:ext uri="{FF2B5EF4-FFF2-40B4-BE49-F238E27FC236}">
-                <a16:creationId xmlns:a16="http://schemas.microsoft.com/office/drawing/2014/main" id="{913A2E54-DAED-E847-93E1-D91F0A4CC4F1}"/>
+                <a16:creationId xmlns:a16="http://schemas.microsoft.com/office/drawing/2014/main" xmlns="" id="{913A2E54-DAED-E847-93E1-D91F0A4CC4F1}"/>
               </a:ext>
             </a:extLst>
           </p:cNvPr>
@@ -10547,7 +10548,7 @@
           <a:p>
             <a:fld id="{0E812A91-4582-B444-871F-72F1C2FA284F}" type="datetime1">
               <a:rPr lang="sv-SE" smtClean="0"/>
-              <a:t>2018-03-18</a:t>
+              <a:t>2023-05-03</a:t>
             </a:fld>
             <a:endParaRPr lang="sv-SE"/>
           </a:p>
@@ -10907,7 +10908,7 @@
           <a:p>
             <a:fld id="{9860EEE5-BDAD-1F45-B7A1-8CC60E7C0D60}" type="datetime1">
               <a:rPr lang="sv-SE" smtClean="0"/>
-              <a:t>2018-03-18</a:t>
+              <a:t>2023-05-03</a:t>
             </a:fld>
             <a:endParaRPr lang="sv-SE"/>
           </a:p>
@@ -11144,7 +11145,7 @@
           <a:p>
             <a:fld id="{AFD0616E-5C8C-4044-B81F-34CA2FFCF210}" type="datetime1">
               <a:rPr lang="sv-SE" smtClean="0"/>
-              <a:t>2018-03-18</a:t>
+              <a:t>2023-05-03</a:t>
             </a:fld>
             <a:endParaRPr lang="sv-SE"/>
           </a:p>
@@ -11330,7 +11331,7 @@
           <a:p>
             <a:fld id="{369FE61E-5682-764B-B716-A25ADC77934B}" type="datetime1">
               <a:rPr lang="sv-SE" smtClean="0"/>
-              <a:t>2018-03-18</a:t>
+              <a:t>2023-05-03</a:t>
             </a:fld>
             <a:endParaRPr lang="sv-SE"/>
           </a:p>
@@ -11538,7 +11539,7 @@
           <a:p>
             <a:fld id="{1289575C-4E23-C842-8CB6-3A3CAD9C27E3}" type="datetime1">
               <a:rPr lang="sv-SE" smtClean="0"/>
-              <a:t>2018-03-18</a:t>
+              <a:t>2023-05-03</a:t>
             </a:fld>
             <a:endParaRPr lang="sv-SE"/>
           </a:p>
@@ -15012,7 +15013,7 @@
           <a:p>
             <a:fld id="{2C3CE2F6-75EB-E145-97E4-6A8B22012B1C}" type="datetime1">
               <a:rPr lang="sv-SE" smtClean="0"/>
-              <a:t>2018-03-18</a:t>
+              <a:t>2023-05-03</a:t>
             </a:fld>
             <a:endParaRPr lang="sv-SE"/>
           </a:p>
@@ -15164,7 +15165,7 @@
           <a:p>
             <a:fld id="{7896BC28-4126-D644-A232-753F1F79F168}" type="datetime1">
               <a:rPr lang="sv-SE" smtClean="0"/>
-              <a:t>2018-03-18</a:t>
+              <a:t>2023-05-03</a:t>
             </a:fld>
             <a:endParaRPr lang="sv-SE"/>
           </a:p>
@@ -15486,7 +15487,7 @@
             </a:pPr>
             <a:fld id="{FD891CAE-1E8D-854E-BE4C-6D15A1CDACE7}" type="datetime1">
               <a:rPr lang="sv-SE" smtClean="0"/>
-              <a:t>2018-03-18</a:t>
+              <a:t>2023-05-03</a:t>
             </a:fld>
             <a:endParaRPr lang="en-GB" dirty="0"/>
           </a:p>
@@ -16078,14 +16079,30 @@
           <a:p>
             <a:r>
               <a:rPr lang="en-GB" dirty="0"/>
-              <a:t>SD2231 – Lab X Group X</a:t>
+              <a:t>SD2231 – Lab </a:t>
+            </a:r>
+            <a:r>
+              <a:rPr lang="en-GB" dirty="0" smtClean="0"/>
+              <a:t>2 </a:t>
+            </a:r>
+            <a:r>
+              <a:rPr lang="en-GB" dirty="0"/>
+              <a:t>Group </a:t>
+            </a:r>
+            <a:r>
+              <a:rPr lang="en-GB" dirty="0" smtClean="0"/>
+              <a:t>7</a:t>
+            </a:r>
+            <a:r>
+              <a:rPr lang="en-GB" dirty="0"/>
+              <a:t/>
             </a:r>
             <a:br>
               <a:rPr lang="en-GB" dirty="0"/>
             </a:br>
             <a:r>
-              <a:rPr lang="en-GB" sz="3100" b="0" dirty="0"/>
-              <a:t>Introduction lecture</a:t>
+              <a:rPr lang="en-GB" sz="3100" b="0" dirty="0" smtClean="0"/>
+              <a:t>Lateral slip estimation</a:t>
             </a:r>
             <a:endParaRPr lang="en-US" sz="3100" b="0" dirty="0"/>
           </a:p>
@@ -16112,15 +16129,17 @@
           <a:lstStyle/>
           <a:p>
             <a:r>
-              <a:rPr lang="en-US" dirty="0"/>
-              <a:t>John Doe</a:t>
+              <a:rPr lang="en-US" dirty="0" smtClean="0"/>
+              <a:t>Alessandro Riva</a:t>
             </a:r>
+            <a:endParaRPr lang="en-US" dirty="0"/>
           </a:p>
           <a:p>
             <a:r>
-              <a:rPr lang="en-US" dirty="0"/>
-              <a:t>Jane Doe</a:t>
+              <a:rPr lang="en-US" dirty="0" smtClean="0"/>
+              <a:t>Tawsiful Islam</a:t>
             </a:r>
+            <a:endParaRPr lang="en-US" dirty="0"/>
           </a:p>
         </p:txBody>
       </p:sp>
@@ -16171,7 +16190,7 @@
           <a:p>
             <a:fld id="{CF40B854-B0F2-8641-BC9B-D1C8EBDC2A17}" type="datetime1">
               <a:rPr lang="sv-SE" smtClean="0"/>
-              <a:t>2018-03-18</a:t>
+              <a:t>2023-05-03</a:t>
             </a:fld>
             <a:endParaRPr lang="sv-SE"/>
           </a:p>
@@ -16268,8 +16287,26 @@
               <a:buChar char="•"/>
             </a:pPr>
             <a:r>
-              <a:rPr lang="en-US" dirty="0"/>
-              <a:t>You should present your unique feature in your Lab assignment</a:t>
+              <a:rPr lang="en-US" dirty="0" smtClean="0"/>
+              <a:t>Biggest issue with the integrating the lateral acceleration is tha</a:t>
+            </a:r>
+            <a:r>
+              <a:rPr lang="en-US" dirty="0" smtClean="0"/>
+              <a:t>t it integrates from the beginning of the simulation before actual test drive.</a:t>
+            </a:r>
+          </a:p>
+          <a:p>
+            <a:pPr marL="457200" indent="-457200">
+              <a:buFont typeface="Arial" charset="0"/>
+              <a:buChar char="•"/>
+            </a:pPr>
+            <a:r>
+              <a:rPr lang="en-US" dirty="0" smtClean="0"/>
+              <a:t>Solution: Activate the integral from the tim</a:t>
+            </a:r>
+            <a:r>
+              <a:rPr lang="en-US" dirty="0" smtClean="0"/>
+              <a:t>e instance the steering angle is large enough.</a:t>
             </a:r>
           </a:p>
           <a:p>
@@ -16278,26 +16315,8 @@
               <a:buChar char="•"/>
             </a:pPr>
             <a:r>
-              <a:rPr lang="en-US" sz="1800" dirty="0"/>
-              <a:t>Something that you think only your group have done</a:t>
-            </a:r>
-          </a:p>
-          <a:p>
-            <a:pPr marL="812800" lvl="1" indent="-457200">
-              <a:buFont typeface="Arial" charset="0"/>
-              <a:buChar char="•"/>
-            </a:pPr>
-            <a:r>
-              <a:rPr lang="en-US" sz="1800" dirty="0"/>
-              <a:t>Can be </a:t>
-            </a:r>
-            <a:r>
-              <a:rPr lang="en-US" sz="1800" dirty="0" err="1"/>
-              <a:t>Matlab</a:t>
-            </a:r>
-            <a:r>
-              <a:rPr lang="en-US" sz="1800" dirty="0"/>
-              <a:t> scripts, Simulink models, analysis, etc.</a:t>
+              <a:rPr lang="en-US" dirty="0" smtClean="0"/>
+              <a:t>Estimating the lateral states are interesting when the slip is large, which cannot happen when there is no steering input.</a:t>
             </a:r>
             <a:endParaRPr lang="en-US" dirty="0"/>
           </a:p>
@@ -16357,7 +16376,7 @@
           <a:p>
             <a:fld id="{0E812A91-4582-B444-871F-72F1C2FA284F}" type="datetime1">
               <a:rPr lang="sv-SE" smtClean="0"/>
-              <a:t>2018-03-18</a:t>
+              <a:t>2023-05-03</a:t>
             </a:fld>
             <a:endParaRPr lang="sv-SE"/>
           </a:p>
@@ -16459,19 +16478,28 @@
               <a:buChar char="•"/>
             </a:pPr>
             <a:r>
-              <a:rPr lang="en-US" dirty="0"/>
-              <a:t>Present the most difficult part for your group in this lab</a:t>
+              <a:rPr lang="en-US" dirty="0" smtClean="0"/>
+              <a:t>Tuning parameters (like </a:t>
+            </a:r>
+            <a:r>
+              <a:rPr lang="en-US" dirty="0" err="1" smtClean="0"/>
+              <a:t>Cf</a:t>
+            </a:r>
+            <a:r>
+              <a:rPr lang="en-US" dirty="0" smtClean="0"/>
+              <a:t> &amp; Cr), and process &amp; measurement noise was the most difficult process.</a:t>
             </a:r>
           </a:p>
           <a:p>
-            <a:pPr marL="698500" lvl="1" indent="-342900">
+            <a:pPr marL="342900" indent="-342900">
               <a:buFont typeface="Arial"/>
               <a:buChar char="•"/>
             </a:pPr>
             <a:r>
-              <a:rPr lang="en-US" dirty="0"/>
-              <a:t>Present which step or part of the lab that was most challenging for your group</a:t>
+              <a:rPr lang="en-US" dirty="0" smtClean="0"/>
+              <a:t>A lot of manual tuning to make sure it works well for all test drives.</a:t>
             </a:r>
+            <a:endParaRPr lang="en-US" dirty="0"/>
           </a:p>
           <a:p>
             <a:pPr marL="698500" lvl="1" indent="-342900">
@@ -16532,7 +16560,7 @@
           <a:p>
             <a:fld id="{0E812A91-4582-B444-871F-72F1C2FA284F}" type="datetime1">
               <a:rPr lang="sv-SE" smtClean="0"/>
-              <a:t>2018-03-18</a:t>
+              <a:t>2023-05-03</a:t>
             </a:fld>
             <a:endParaRPr lang="sv-SE"/>
           </a:p>
@@ -16670,10 +16698,214 @@
   <p:clrMapOvr>
     <a:masterClrMapping/>
   </p:clrMapOvr>
+  <p:timing>
+    <p:tnLst>
+      <p:par>
+        <p:cTn id="1" dur="indefinite" restart="never" nodeType="tmRoot"/>
+      </p:par>
+    </p:tnLst>
+  </p:timing>
 </p:sld>
 </file>
 
 <file path=ppt/slides/slide5.xml><?xml version="1.0" encoding="utf-8"?>
+<p:sld xmlns:a="http://schemas.openxmlformats.org/drawingml/2006/main" xmlns:r="http://schemas.openxmlformats.org/officeDocument/2006/relationships" xmlns:p="http://schemas.openxmlformats.org/presentationml/2006/main">
+  <p:cSld>
+    <p:spTree>
+      <p:nvGrpSpPr>
+        <p:cNvPr id="1" name=""/>
+        <p:cNvGrpSpPr/>
+        <p:nvPr/>
+      </p:nvGrpSpPr>
+      <p:grpSpPr>
+        <a:xfrm>
+          <a:off x="0" y="0"/>
+          <a:ext cx="0" cy="0"/>
+          <a:chOff x="0" y="0"/>
+          <a:chExt cx="0" cy="0"/>
+        </a:xfrm>
+      </p:grpSpPr>
+      <p:sp>
+        <p:nvSpPr>
+          <p:cNvPr id="2" name="Date Placeholder 1"/>
+          <p:cNvSpPr>
+            <a:spLocks noGrp="1"/>
+          </p:cNvSpPr>
+          <p:nvPr>
+            <p:ph type="dt" sz="half" idx="10"/>
+          </p:nvPr>
+        </p:nvSpPr>
+        <p:spPr/>
+        <p:txBody>
+          <a:bodyPr/>
+          <a:lstStyle/>
+          <a:p>
+            <a:fld id="{0E812A91-4582-B444-871F-72F1C2FA284F}" type="datetime1">
+              <a:rPr lang="sv-SE" smtClean="0"/>
+              <a:t>2023-05-03</a:t>
+            </a:fld>
+            <a:endParaRPr lang="sv-SE"/>
+          </a:p>
+        </p:txBody>
+      </p:sp>
+      <p:sp>
+        <p:nvSpPr>
+          <p:cNvPr id="3" name="Slide Number Placeholder 2"/>
+          <p:cNvSpPr>
+            <a:spLocks noGrp="1"/>
+          </p:cNvSpPr>
+          <p:nvPr>
+            <p:ph type="sldNum" sz="quarter" idx="12"/>
+          </p:nvPr>
+        </p:nvSpPr>
+        <p:spPr/>
+        <p:txBody>
+          <a:bodyPr/>
+          <a:lstStyle/>
+          <a:p>
+            <a:fld id="{680D72F4-1C41-4187-A4BC-492CF086CF40}" type="slidenum">
+              <a:rPr lang="en-GB" smtClean="0"/>
+              <a:pPr/>
+              <a:t>5</a:t>
+            </a:fld>
+            <a:endParaRPr lang="en-GB"/>
+          </a:p>
+        </p:txBody>
+      </p:sp>
+      <p:sp>
+        <p:nvSpPr>
+          <p:cNvPr id="4" name="Footer Placeholder 3"/>
+          <p:cNvSpPr>
+            <a:spLocks noGrp="1"/>
+          </p:cNvSpPr>
+          <p:nvPr>
+            <p:ph type="ftr" sz="quarter" idx="11"/>
+          </p:nvPr>
+        </p:nvSpPr>
+        <p:spPr/>
+        <p:txBody>
+          <a:bodyPr/>
+          <a:lstStyle/>
+          <a:p>
+            <a:r>
+              <a:rPr lang="fr-FR"/>
+              <a:t>SD2231 - Applied vehicle dynamics control</a:t>
+            </a:r>
+            <a:endParaRPr lang="en-GB" dirty="0"/>
+          </a:p>
+        </p:txBody>
+      </p:sp>
+      <p:pic>
+        <p:nvPicPr>
+          <p:cNvPr id="8" name="Bildobjekt 7"/>
+          <p:cNvPicPr>
+            <a:picLocks noChangeAspect="1"/>
+          </p:cNvPicPr>
+          <p:nvPr/>
+        </p:nvPicPr>
+        <p:blipFill>
+          <a:blip r:embed="rId2">
+            <a:extLst>
+              <a:ext uri="{28A0092B-C50C-407E-A947-70E740481C1C}">
+                <a14:useLocalDpi xmlns:a14="http://schemas.microsoft.com/office/drawing/2010/main" val="0"/>
+              </a:ext>
+            </a:extLst>
+          </a:blip>
+          <a:stretch>
+            <a:fillRect/>
+          </a:stretch>
+        </p:blipFill>
+        <p:spPr>
+          <a:xfrm>
+            <a:off x="360133" y="79106"/>
+            <a:ext cx="4154717" cy="3116038"/>
+          </a:xfrm>
+          <a:prstGeom prst="rect">
+            <a:avLst/>
+          </a:prstGeom>
+        </p:spPr>
+      </p:pic>
+      <p:pic>
+        <p:nvPicPr>
+          <p:cNvPr id="10" name="Bildobjekt 9"/>
+          <p:cNvPicPr>
+            <a:picLocks noChangeAspect="1"/>
+          </p:cNvPicPr>
+          <p:nvPr/>
+        </p:nvPicPr>
+        <p:blipFill>
+          <a:blip r:embed="rId3">
+            <a:extLst>
+              <a:ext uri="{28A0092B-C50C-407E-A947-70E740481C1C}">
+                <a14:useLocalDpi xmlns:a14="http://schemas.microsoft.com/office/drawing/2010/main" val="0"/>
+              </a:ext>
+            </a:extLst>
+          </a:blip>
+          <a:stretch>
+            <a:fillRect/>
+          </a:stretch>
+        </p:blipFill>
+        <p:spPr>
+          <a:xfrm>
+            <a:off x="4739224" y="117699"/>
+            <a:ext cx="4103260" cy="3077445"/>
+          </a:xfrm>
+          <a:prstGeom prst="rect">
+            <a:avLst/>
+          </a:prstGeom>
+        </p:spPr>
+      </p:pic>
+      <p:pic>
+        <p:nvPicPr>
+          <p:cNvPr id="11" name="Bildobjekt 10"/>
+          <p:cNvPicPr>
+            <a:picLocks noChangeAspect="1"/>
+          </p:cNvPicPr>
+          <p:nvPr/>
+        </p:nvPicPr>
+        <p:blipFill>
+          <a:blip r:embed="rId4">
+            <a:extLst>
+              <a:ext uri="{28A0092B-C50C-407E-A947-70E740481C1C}">
+                <a14:useLocalDpi xmlns:a14="http://schemas.microsoft.com/office/drawing/2010/main" val="0"/>
+              </a:ext>
+            </a:extLst>
+          </a:blip>
+          <a:stretch>
+            <a:fillRect/>
+          </a:stretch>
+        </p:blipFill>
+        <p:spPr>
+          <a:xfrm>
+            <a:off x="2664044" y="3195144"/>
+            <a:ext cx="3701612" cy="2776209"/>
+          </a:xfrm>
+          <a:prstGeom prst="rect">
+            <a:avLst/>
+          </a:prstGeom>
+        </p:spPr>
+      </p:pic>
+    </p:spTree>
+    <p:extLst>
+      <p:ext uri="{BB962C8B-B14F-4D97-AF65-F5344CB8AC3E}">
+        <p14:creationId xmlns:p14="http://schemas.microsoft.com/office/powerpoint/2010/main" val="3295620370"/>
+      </p:ext>
+    </p:extLst>
+  </p:cSld>
+  <p:clrMapOvr>
+    <a:masterClrMapping/>
+  </p:clrMapOvr>
+  <p:timing>
+    <p:tnLst>
+      <p:par>
+        <p:cTn id="1" dur="indefinite" restart="never" nodeType="tmRoot"/>
+      </p:par>
+    </p:tnLst>
+  </p:timing>
+</p:sld>
+</file>
+
+<file path=ppt/slides/slide6.xml><?xml version="1.0" encoding="utf-8"?>
 <p:sld xmlns:a="http://schemas.openxmlformats.org/drawingml/2006/main" xmlns:r="http://schemas.openxmlformats.org/officeDocument/2006/relationships" xmlns:p="http://schemas.openxmlformats.org/presentationml/2006/main">
   <p:cSld>
     <p:spTree>
@@ -16707,7 +16939,7 @@
           <a:p>
             <a:fld id="{6379FCBD-D56F-E046-A8D3-ADC3EF4D6E9A}" type="datetime1">
               <a:rPr lang="sv-SE" smtClean="0"/>
-              <a:t>2018-03-18</a:t>
+              <a:t>2023-05-03</a:t>
             </a:fld>
             <a:endParaRPr lang="sv-SE"/>
           </a:p>
@@ -16731,7 +16963,7 @@
             <a:fld id="{680D72F4-1C41-4187-A4BC-492CF086CF40}" type="slidenum">
               <a:rPr lang="en-GB" smtClean="0"/>
               <a:pPr/>
-              <a:t>5</a:t>
+              <a:t>6</a:t>
             </a:fld>
             <a:endParaRPr lang="en-GB"/>
           </a:p>
@@ -16782,17 +17014,17 @@
           </a:ln>
           <a:extLst>
             <a:ext uri="{FAA26D3D-D897-4be2-8F04-BA451C77F1D7}">
-              <ma14:placeholderFlag xmlns:ma14="http://schemas.microsoft.com/office/mac/drawingml/2011/main" xmlns="" val="1"/>
+              <ma14:placeholderFlag xmlns="" xmlns:ma14="http://schemas.microsoft.com/office/mac/drawingml/2011/main" val="1"/>
             </a:ext>
             <a:ext uri="{909E8E84-426E-40dd-AFC4-6F175D3DCCD1}">
-              <a14:hiddenFill xmlns="" xmlns:a14="http://schemas.microsoft.com/office/drawing/2010/main">
+              <a14:hiddenFill xmlns:a14="http://schemas.microsoft.com/office/drawing/2010/main" xmlns="">
                 <a:solidFill>
                   <a:srgbClr val="FFFFFF"/>
                 </a:solidFill>
               </a14:hiddenFill>
             </a:ext>
             <a:ext uri="{91240B29-F687-4f45-9708-019B960494DF}">
-              <a14:hiddenLine xmlns="" xmlns:a14="http://schemas.microsoft.com/office/drawing/2010/main" w="9525">
+              <a14:hiddenLine xmlns:a14="http://schemas.microsoft.com/office/drawing/2010/main" xmlns="" w="9525">
                 <a:solidFill>
                   <a:srgbClr val="000000"/>
                 </a:solidFill>
@@ -16984,17 +17216,17 @@
           </a:ln>
           <a:extLst>
             <a:ext uri="{FAA26D3D-D897-4be2-8F04-BA451C77F1D7}">
-              <ma14:placeholderFlag xmlns:ma14="http://schemas.microsoft.com/office/mac/drawingml/2011/main" xmlns="" val="1"/>
+              <ma14:placeholderFlag xmlns="" xmlns:ma14="http://schemas.microsoft.com/office/mac/drawingml/2011/main" val="1"/>
             </a:ext>
             <a:ext uri="{909E8E84-426E-40dd-AFC4-6F175D3DCCD1}">
-              <a14:hiddenFill xmlns="" xmlns:a14="http://schemas.microsoft.com/office/drawing/2010/main">
+              <a14:hiddenFill xmlns:a14="http://schemas.microsoft.com/office/drawing/2010/main" xmlns="">
                 <a:solidFill>
                   <a:srgbClr val="FFFFFF"/>
                 </a:solidFill>
               </a14:hiddenFill>
             </a:ext>
             <a:ext uri="{91240B29-F687-4f45-9708-019B960494DF}">
-              <a14:hiddenLine xmlns="" xmlns:a14="http://schemas.microsoft.com/office/drawing/2010/main" w="9525">
+              <a14:hiddenLine xmlns:a14="http://schemas.microsoft.com/office/drawing/2010/main" xmlns="" w="9525">
                 <a:solidFill>
                   <a:srgbClr val="000000"/>
                 </a:solidFill>
@@ -17125,6 +17357,17 @@
           </a:lstStyle>
           <a:p>
             <a:pPr algn="ctr" eaLnBrk="1" hangingPunct="1"/>
+            <a:r>
+              <a:rPr lang="en-US" sz="4000" b="1" dirty="0">
+                <a:solidFill>
+                  <a:schemeClr val="accent2"/>
+                </a:solidFill>
+                <a:latin typeface="Verdana" charset="0"/>
+                <a:ea typeface="ＭＳ Ｐゴシック" charset="0"/>
+                <a:cs typeface="ＭＳ Ｐゴシック" charset="0"/>
+              </a:rPr>
+              <a:t/>
+            </a:r>
             <a:br>
               <a:rPr lang="en-US" sz="4000" b="1" dirty="0">
                 <a:solidFill>
@@ -17192,6 +17435,13 @@
   <p:clrMapOvr>
     <a:masterClrMapping/>
   </p:clrMapOvr>
+  <p:timing>
+    <p:tnLst>
+      <p:par>
+        <p:cTn id="1" dur="indefinite" restart="never" nodeType="tmRoot"/>
+      </p:par>
+    </p:tnLst>
+  </p:timing>
 </p:sld>
 </file>
 

</xml_diff>